<commit_message>
Commiting final code with latest changes
</commit_message>
<xml_diff>
--- a/Final_slide/Generated_Presentation.pptx
+++ b/Final_slide/Generated_Presentation.pptx
@@ -8,6 +8,12 @@
     <p:sldId id="256" r:id="rId7"/>
     <p:sldId id="257" r:id="rId8"/>
     <p:sldId id="258" r:id="rId9"/>
+    <p:sldId id="259" r:id="rId10"/>
+    <p:sldId id="260" r:id="rId11"/>
+    <p:sldId id="261" r:id="rId12"/>
+    <p:sldId id="262" r:id="rId13"/>
+    <p:sldId id="263" r:id="rId14"/>
+    <p:sldId id="264" r:id="rId15"/>
   </p:sldIdLst>
   <p:sldSz cx="9144000" cy="6858000" type="screen4x3"/>
   <p:notesSz cx="6858000" cy="9144000"/>
@@ -3097,39 +3103,35 @@
             <a:spLocks noGrp="1"/>
           </p:cNvSpPr>
           <p:nvPr>
-            <p:ph type="ctrTitle"/>
-          </p:nvPr>
-        </p:nvSpPr>
-        <p:spPr/>
-        <p:txBody>
-          <a:bodyPr/>
-          <a:lstStyle/>
-          <a:p>
-            <a:r>
-              <a:t>Overview of CAFB Operations</a:t>
-            </a:r>
-          </a:p>
-        </p:txBody>
-      </p:sp>
-      <p:sp>
-        <p:nvSpPr>
-          <p:cNvPr id="3" name="Subtitle 2"/>
-          <p:cNvSpPr>
-            <a:spLocks noGrp="1"/>
-          </p:cNvSpPr>
-          <p:nvPr>
-            <p:ph type="subTitle" idx="1"/>
-          </p:nvPr>
-        </p:nvSpPr>
-        <p:spPr/>
-        <p:txBody>
-          <a:bodyPr/>
-          <a:lstStyle/>
-          <a:p>
-            <a:r>
-              <a:t>Addressing hunger today and driving brighter futures</a:t>
-            </a:r>
-          </a:p>
+            <p:ph type="title"/>
+          </p:nvPr>
+        </p:nvSpPr>
+        <p:spPr/>
+        <p:txBody>
+          <a:bodyPr/>
+          <a:lstStyle/>
+          <a:p>
+            <a:r>
+              <a:t>Community Health Initiative Roadmap</a:t>
+            </a:r>
+          </a:p>
+        </p:txBody>
+      </p:sp>
+      <p:sp>
+        <p:nvSpPr>
+          <p:cNvPr id="3" name="Content Placeholder 2"/>
+          <p:cNvSpPr>
+            <a:spLocks noGrp="1"/>
+          </p:cNvSpPr>
+          <p:nvPr>
+            <p:ph idx="1"/>
+          </p:nvPr>
+        </p:nvSpPr>
+        <p:spPr/>
+        <p:txBody>
+          <a:bodyPr/>
+          <a:lstStyle/>
+          <a:p/>
         </p:txBody>
       </p:sp>
     </p:spTree>
@@ -3164,11 +3166,7 @@
         <p:txBody>
           <a:bodyPr/>
           <a:lstStyle/>
-          <a:p>
-            <a:r>
-              <a:t>CAFB and its mission</a:t>
-            </a:r>
-          </a:p>
+          <a:p/>
         </p:txBody>
       </p:sp>
       <p:sp>
@@ -3186,36 +3184,6 @@
           <a:bodyPr/>
           <a:lstStyle/>
           <a:p/>
-          <a:p>
-            <a:pPr/>
-            <a:r>
-              <a:t>Dual focus: Food to address hunger today</a:t>
-            </a:r>
-          </a:p>
-          <a:p>
-            <a:pPr/>
-            <a:r>
-              <a:t>Food for brighter futures tomorrow</a:t>
-            </a:r>
-          </a:p>
-          <a:p>
-            <a:pPr/>
-            <a:r>
-              <a:t>Continued food distribution and partner work</a:t>
-            </a:r>
-          </a:p>
-          <a:p>
-            <a:pPr/>
-            <a:r>
-              <a:t>New pilots to address root causes</a:t>
-            </a:r>
-          </a:p>
-          <a:p>
-            <a:pPr/>
-            <a:r>
-              <a:t>Reduce number of food insecure individuals</a:t>
-            </a:r>
-          </a:p>
         </p:txBody>
       </p:sp>
     </p:spTree>
@@ -3252,7 +3220,7 @@
           <a:lstStyle/>
           <a:p>
             <a:r>
-              <a:t>Hunger and its way off dealing with things</a:t>
+              <a:t>Community Outreach and Education</a:t>
             </a:r>
           </a:p>
         </p:txBody>
@@ -3275,31 +3243,441 @@
           <a:p>
             <a:pPr/>
             <a:r>
-              <a:t>High rates of food insecurity underscore priority</a:t>
+              <a:t>Improve screening awareness</a:t>
             </a:r>
           </a:p>
           <a:p>
             <a:pPr/>
             <a:r>
-              <a:t>CAFB associated mainly with food delivery</a:t>
+              <a:t>Provide trusted information sources</a:t>
             </a:r>
           </a:p>
           <a:p>
             <a:pPr/>
             <a:r>
-              <a:t>Reliance on pro bono for awareness campaigns</a:t>
-            </a:r>
-          </a:p>
+              <a:t>Engage local communities</a:t>
+            </a:r>
+          </a:p>
+        </p:txBody>
+      </p:sp>
+    </p:spTree>
+  </p:cSld>
+  <p:clrMapOvr>
+    <a:masterClrMapping/>
+  </p:clrMapOvr>
+</p:sld>
+</file>
+
+<file path=ppt/slides/slide4.xml><?xml version="1.0" encoding="utf-8"?>
+<p:sld xmlns:a="http://schemas.openxmlformats.org/drawingml/2006/main" xmlns:p="http://schemas.openxmlformats.org/presentationml/2006/main" xmlns:r="http://schemas.openxmlformats.org/officeDocument/2006/relationships">
+  <p:cSld>
+    <p:spTree>
+      <p:nvGrpSpPr>
+        <p:cNvPr id="1" name=""/>
+        <p:cNvGrpSpPr/>
+        <p:nvPr/>
+      </p:nvGrpSpPr>
+      <p:grpSpPr/>
+      <p:sp>
+        <p:nvSpPr>
+          <p:cNvPr id="2" name="Title 1"/>
+          <p:cNvSpPr>
+            <a:spLocks noGrp="1"/>
+          </p:cNvSpPr>
+          <p:nvPr>
+            <p:ph type="title"/>
+          </p:nvPr>
+        </p:nvSpPr>
+        <p:spPr/>
+        <p:txBody>
+          <a:bodyPr/>
+          <a:lstStyle/>
+          <a:p>
+            <a:r>
+              <a:t>Operational Efficiency and Accuracy</a:t>
+            </a:r>
+          </a:p>
+        </p:txBody>
+      </p:sp>
+      <p:sp>
+        <p:nvSpPr>
+          <p:cNvPr id="3" name="Content Placeholder 2"/>
+          <p:cNvSpPr>
+            <a:spLocks noGrp="1"/>
+          </p:cNvSpPr>
+          <p:nvPr>
+            <p:ph idx="1"/>
+          </p:nvPr>
+        </p:nvSpPr>
+        <p:spPr/>
+        <p:txBody>
+          <a:bodyPr/>
+          <a:lstStyle/>
+          <a:p/>
           <a:p>
             <a:pPr/>
             <a:r>
-              <a:t>CAFB-branding primarily within its community</a:t>
+              <a:t>Streamline processes</a:t>
             </a:r>
           </a:p>
           <a:p>
             <a:pPr/>
             <a:r>
-              <a:t>Build strategic awareness with all stakeholders</a:t>
+              <a:t>Enhance quality assurance</a:t>
+            </a:r>
+          </a:p>
+          <a:p>
+            <a:pPr/>
+            <a:r>
+              <a:t>Incorporate screening data</a:t>
+            </a:r>
+          </a:p>
+        </p:txBody>
+      </p:sp>
+    </p:spTree>
+  </p:cSld>
+  <p:clrMapOvr>
+    <a:masterClrMapping/>
+  </p:clrMapOvr>
+</p:sld>
+</file>
+
+<file path=ppt/slides/slide5.xml><?xml version="1.0" encoding="utf-8"?>
+<p:sld xmlns:a="http://schemas.openxmlformats.org/drawingml/2006/main" xmlns:p="http://schemas.openxmlformats.org/presentationml/2006/main" xmlns:r="http://schemas.openxmlformats.org/officeDocument/2006/relationships">
+  <p:cSld>
+    <p:spTree>
+      <p:nvGrpSpPr>
+        <p:cNvPr id="1" name=""/>
+        <p:cNvGrpSpPr/>
+        <p:nvPr/>
+      </p:nvGrpSpPr>
+      <p:grpSpPr/>
+      <p:sp>
+        <p:nvSpPr>
+          <p:cNvPr id="2" name="Title 1"/>
+          <p:cNvSpPr>
+            <a:spLocks noGrp="1"/>
+          </p:cNvSpPr>
+          <p:nvPr>
+            <p:ph type="title"/>
+          </p:nvPr>
+        </p:nvSpPr>
+        <p:spPr/>
+        <p:txBody>
+          <a:bodyPr/>
+          <a:lstStyle/>
+          <a:p/>
+        </p:txBody>
+      </p:sp>
+      <p:sp>
+        <p:nvSpPr>
+          <p:cNvPr id="3" name="Content Placeholder 2"/>
+          <p:cNvSpPr>
+            <a:spLocks noGrp="1"/>
+          </p:cNvSpPr>
+          <p:nvPr>
+            <p:ph idx="1"/>
+          </p:nvPr>
+        </p:nvSpPr>
+        <p:spPr/>
+        <p:txBody>
+          <a:bodyPr/>
+          <a:lstStyle/>
+          <a:p/>
+        </p:txBody>
+      </p:sp>
+    </p:spTree>
+  </p:cSld>
+  <p:clrMapOvr>
+    <a:masterClrMapping/>
+  </p:clrMapOvr>
+</p:sld>
+</file>
+
+<file path=ppt/slides/slide6.xml><?xml version="1.0" encoding="utf-8"?>
+<p:sld xmlns:a="http://schemas.openxmlformats.org/drawingml/2006/main" xmlns:p="http://schemas.openxmlformats.org/presentationml/2006/main" xmlns:r="http://schemas.openxmlformats.org/officeDocument/2006/relationships">
+  <p:cSld>
+    <p:spTree>
+      <p:nvGrpSpPr>
+        <p:cNvPr id="1" name=""/>
+        <p:cNvGrpSpPr/>
+        <p:nvPr/>
+      </p:nvGrpSpPr>
+      <p:grpSpPr/>
+      <p:sp>
+        <p:nvSpPr>
+          <p:cNvPr id="2" name="Title 1"/>
+          <p:cNvSpPr>
+            <a:spLocks noGrp="1"/>
+          </p:cNvSpPr>
+          <p:nvPr>
+            <p:ph type="title"/>
+          </p:nvPr>
+        </p:nvSpPr>
+        <p:spPr/>
+        <p:txBody>
+          <a:bodyPr/>
+          <a:lstStyle/>
+          <a:p>
+            <a:r>
+              <a:t>2022 Goals</a:t>
+            </a:r>
+          </a:p>
+        </p:txBody>
+      </p:sp>
+      <p:sp>
+        <p:nvSpPr>
+          <p:cNvPr id="3" name="Content Placeholder 2"/>
+          <p:cNvSpPr>
+            <a:spLocks noGrp="1"/>
+          </p:cNvSpPr>
+          <p:nvPr>
+            <p:ph idx="1"/>
+          </p:nvPr>
+        </p:nvSpPr>
+        <p:spPr/>
+        <p:txBody>
+          <a:bodyPr/>
+          <a:lstStyle/>
+          <a:p/>
+          <a:p>
+            <a:pPr/>
+            <a:r>
+              <a:t>Increased screening rates</a:t>
+            </a:r>
+          </a:p>
+          <a:p>
+            <a:pPr/>
+            <a:r>
+              <a:t>Statewide awareness campaigns</a:t>
+            </a:r>
+          </a:p>
+          <a:p>
+            <a:pPr/>
+            <a:r>
+              <a:t>Baseline data integration</a:t>
+            </a:r>
+          </a:p>
+        </p:txBody>
+      </p:sp>
+    </p:spTree>
+  </p:cSld>
+  <p:clrMapOvr>
+    <a:masterClrMapping/>
+  </p:clrMapOvr>
+</p:sld>
+</file>
+
+<file path=ppt/slides/slide7.xml><?xml version="1.0" encoding="utf-8"?>
+<p:sld xmlns:a="http://schemas.openxmlformats.org/drawingml/2006/main" xmlns:p="http://schemas.openxmlformats.org/presentationml/2006/main" xmlns:r="http://schemas.openxmlformats.org/officeDocument/2006/relationships">
+  <p:cSld>
+    <p:spTree>
+      <p:nvGrpSpPr>
+        <p:cNvPr id="1" name=""/>
+        <p:cNvGrpSpPr/>
+        <p:nvPr/>
+      </p:nvGrpSpPr>
+      <p:grpSpPr/>
+      <p:sp>
+        <p:nvSpPr>
+          <p:cNvPr id="2" name="Title 1"/>
+          <p:cNvSpPr>
+            <a:spLocks noGrp="1"/>
+          </p:cNvSpPr>
+          <p:nvPr>
+            <p:ph type="title"/>
+          </p:nvPr>
+        </p:nvSpPr>
+        <p:spPr/>
+        <p:txBody>
+          <a:bodyPr/>
+          <a:lstStyle/>
+          <a:p>
+            <a:r>
+              <a:t>2023 Targets</a:t>
+            </a:r>
+          </a:p>
+        </p:txBody>
+      </p:sp>
+      <p:sp>
+        <p:nvSpPr>
+          <p:cNvPr id="3" name="Content Placeholder 2"/>
+          <p:cNvSpPr>
+            <a:spLocks noGrp="1"/>
+          </p:cNvSpPr>
+          <p:nvPr>
+            <p:ph idx="1"/>
+          </p:nvPr>
+        </p:nvSpPr>
+        <p:spPr/>
+        <p:txBody>
+          <a:bodyPr/>
+          <a:lstStyle/>
+          <a:p/>
+          <a:p>
+            <a:pPr/>
+            <a:r>
+              <a:t>Expand geographic reach</a:t>
+            </a:r>
+          </a:p>
+          <a:p>
+            <a:pPr/>
+            <a:r>
+              <a:t>Improve screening adherence</a:t>
+            </a:r>
+          </a:p>
+          <a:p>
+            <a:pPr/>
+            <a:r>
+              <a:t>QA process enhancements</a:t>
+            </a:r>
+          </a:p>
+        </p:txBody>
+      </p:sp>
+    </p:spTree>
+  </p:cSld>
+  <p:clrMapOvr>
+    <a:masterClrMapping/>
+  </p:clrMapOvr>
+</p:sld>
+</file>
+
+<file path=ppt/slides/slide8.xml><?xml version="1.0" encoding="utf-8"?>
+<p:sld xmlns:a="http://schemas.openxmlformats.org/drawingml/2006/main" xmlns:p="http://schemas.openxmlformats.org/presentationml/2006/main" xmlns:r="http://schemas.openxmlformats.org/officeDocument/2006/relationships">
+  <p:cSld>
+    <p:spTree>
+      <p:nvGrpSpPr>
+        <p:cNvPr id="1" name=""/>
+        <p:cNvGrpSpPr/>
+        <p:nvPr/>
+      </p:nvGrpSpPr>
+      <p:grpSpPr/>
+      <p:sp>
+        <p:nvSpPr>
+          <p:cNvPr id="2" name="Title 1"/>
+          <p:cNvSpPr>
+            <a:spLocks noGrp="1"/>
+          </p:cNvSpPr>
+          <p:nvPr>
+            <p:ph type="title"/>
+          </p:nvPr>
+        </p:nvSpPr>
+        <p:spPr/>
+        <p:txBody>
+          <a:bodyPr/>
+          <a:lstStyle/>
+          <a:p>
+            <a:r>
+              <a:t>Key Roles and Responsibilities</a:t>
+            </a:r>
+          </a:p>
+        </p:txBody>
+      </p:sp>
+      <p:sp>
+        <p:nvSpPr>
+          <p:cNvPr id="3" name="Content Placeholder 2"/>
+          <p:cNvSpPr>
+            <a:spLocks noGrp="1"/>
+          </p:cNvSpPr>
+          <p:nvPr>
+            <p:ph idx="1"/>
+          </p:nvPr>
+        </p:nvSpPr>
+        <p:spPr/>
+        <p:txBody>
+          <a:bodyPr/>
+          <a:lstStyle/>
+          <a:p/>
+          <a:p>
+            <a:pPr/>
+            <a:r>
+              <a:t>Auditor: Data monitoring</a:t>
+            </a:r>
+          </a:p>
+          <a:p>
+            <a:pPr/>
+            <a:r>
+              <a:t>Manager: Process oversight</a:t>
+            </a:r>
+          </a:p>
+          <a:p>
+            <a:pPr/>
+            <a:r>
+              <a:t>Outreach: Community engagement</a:t>
+            </a:r>
+          </a:p>
+        </p:txBody>
+      </p:sp>
+    </p:spTree>
+  </p:cSld>
+  <p:clrMapOvr>
+    <a:masterClrMapping/>
+  </p:clrMapOvr>
+</p:sld>
+</file>
+
+<file path=ppt/slides/slide9.xml><?xml version="1.0" encoding="utf-8"?>
+<p:sld xmlns:a="http://schemas.openxmlformats.org/drawingml/2006/main" xmlns:p="http://schemas.openxmlformats.org/presentationml/2006/main" xmlns:r="http://schemas.openxmlformats.org/officeDocument/2006/relationships">
+  <p:cSld>
+    <p:spTree>
+      <p:nvGrpSpPr>
+        <p:cNvPr id="1" name=""/>
+        <p:cNvGrpSpPr/>
+        <p:nvPr/>
+      </p:nvGrpSpPr>
+      <p:grpSpPr/>
+      <p:sp>
+        <p:nvSpPr>
+          <p:cNvPr id="2" name="Title 1"/>
+          <p:cNvSpPr>
+            <a:spLocks noGrp="1"/>
+          </p:cNvSpPr>
+          <p:nvPr>
+            <p:ph type="title"/>
+          </p:nvPr>
+        </p:nvSpPr>
+        <p:spPr/>
+        <p:txBody>
+          <a:bodyPr/>
+          <a:lstStyle/>
+          <a:p>
+            <a:r>
+              <a:t>Risks and Mitigation Strategies</a:t>
+            </a:r>
+          </a:p>
+        </p:txBody>
+      </p:sp>
+      <p:sp>
+        <p:nvSpPr>
+          <p:cNvPr id="3" name="Content Placeholder 2"/>
+          <p:cNvSpPr>
+            <a:spLocks noGrp="1"/>
+          </p:cNvSpPr>
+          <p:nvPr>
+            <p:ph idx="1"/>
+          </p:nvPr>
+        </p:nvSpPr>
+        <p:spPr/>
+        <p:txBody>
+          <a:bodyPr/>
+          <a:lstStyle/>
+          <a:p/>
+          <a:p>
+            <a:pPr/>
+            <a:r>
+              <a:t>Funding gaps: Explore grants</a:t>
+            </a:r>
+          </a:p>
+          <a:p>
+            <a:pPr/>
+            <a:r>
+              <a:t>Outreach challenges: Partnerships</a:t>
+            </a:r>
+          </a:p>
+          <a:p>
+            <a:pPr/>
+            <a:r>
+              <a:t>Data quality: QA reviews</a:t>
             </a:r>
           </a:p>
         </p:txBody>

</xml_diff>